<commit_message>
Reformat a few examples for better PDF output
</commit_message>
<xml_diff>
--- a/Oracle PL-SQL unit testing with ruby-plsql-spec.pptx
+++ b/Oracle PL-SQL unit testing with ruby-plsql-spec.pptx
@@ -8390,7 +8390,7 @@
         <p:spPr>
           <a:xfrm>
             <a:off x="685800" y="630800"/>
-            <a:ext cx="7826100" cy="2964600"/>
+            <a:ext cx="7826100" cy="2964900"/>
           </a:xfrm>
           <a:prstGeom prst="rect">
             <a:avLst/>
@@ -8512,7 +8512,7 @@
         <p:spPr>
           <a:xfrm>
             <a:off x="5657000" y="4976837"/>
-            <a:ext cx="1847850" cy="847725"/>
+            <a:ext cx="1385887" cy="635793"/>
           </a:xfrm>
           <a:prstGeom prst="rect">
             <a:avLst/>
@@ -8540,7 +8540,7 @@
         <p:spPr>
           <a:xfrm>
             <a:off x="548350" y="6199700"/>
-            <a:ext cx="2259175" cy="558849"/>
+            <a:ext cx="1694381" cy="419137"/>
           </a:xfrm>
           <a:prstGeom prst="rect">
             <a:avLst/>
@@ -9524,7 +9524,7 @@
         <p:spPr>
           <a:xfrm>
             <a:off x="311700" y="593377"/>
-            <a:ext cx="8520599" cy="991799"/>
+            <a:ext cx="8520599" cy="991500"/>
           </a:xfrm>
           <a:prstGeom prst="rect">
             <a:avLst/>
@@ -9886,7 +9886,7 @@
         <p:spPr>
           <a:xfrm>
             <a:off x="3016550" y="4620025"/>
-            <a:ext cx="3627600" cy="1423799"/>
+            <a:ext cx="3627600" cy="1423500"/>
           </a:xfrm>
           <a:prstGeom prst="rect">
             <a:avLst/>
@@ -10091,7 +10091,7 @@
         </p:nvCxnSpPr>
         <p:spPr>
           <a:xfrm>
-            <a:off x="6644150" y="5331924"/>
+            <a:off x="6644150" y="5331775"/>
             <a:ext cx="493500" cy="0"/>
           </a:xfrm>
           <a:prstGeom prst="straightConnector1">
@@ -10170,7 +10170,7 @@
         <p:spPr>
           <a:xfrm>
             <a:off x="610346" y="4425250"/>
-            <a:ext cx="1654425" cy="1654425"/>
+            <a:ext cx="1240818" cy="1240818"/>
           </a:xfrm>
           <a:prstGeom prst="rect">
             <a:avLst/>
@@ -10379,7 +10379,7 @@
         <p:spPr>
           <a:xfrm>
             <a:off x="7251900" y="330775"/>
-            <a:ext cx="1474849" cy="1474849"/>
+            <a:ext cx="1106137" cy="1106137"/>
           </a:xfrm>
           <a:prstGeom prst="rect">
             <a:avLst/>
@@ -10631,7 +10631,7 @@
         <p:spPr>
           <a:xfrm>
             <a:off x="311700" y="1536624"/>
-            <a:ext cx="8520599" cy="3863399"/>
+            <a:ext cx="8520599" cy="3863100"/>
           </a:xfrm>
           <a:prstGeom prst="rect">
             <a:avLst/>
@@ -15074,7 +15074,7 @@
         <p:spPr>
           <a:xfrm>
             <a:off x="311700" y="1869550"/>
-            <a:ext cx="8520599" cy="4222200"/>
+            <a:ext cx="8520599" cy="4222500"/>
           </a:xfrm>
           <a:prstGeom prst="rect">
             <a:avLst/>
@@ -15455,7 +15455,7 @@
         <p:spPr>
           <a:xfrm>
             <a:off x="311700" y="2993050"/>
-            <a:ext cx="3121799" cy="3271800"/>
+            <a:ext cx="3121799" cy="3272100"/>
           </a:xfrm>
           <a:prstGeom prst="rect">
             <a:avLst/>
@@ -16197,7 +16197,7 @@
         <p:spPr>
           <a:xfrm>
             <a:off x="4152550" y="2993050"/>
-            <a:ext cx="4071900" cy="3271800"/>
+            <a:ext cx="4071900" cy="3272100"/>
           </a:xfrm>
           <a:prstGeom prst="rect">
             <a:avLst/>
@@ -17048,7 +17048,7 @@
         <p:spPr>
           <a:xfrm>
             <a:off x="311700" y="1536625"/>
-            <a:ext cx="4876199" cy="4555199"/>
+            <a:ext cx="5845200" cy="4555199"/>
           </a:xfrm>
           <a:prstGeom prst="rect">
             <a:avLst/>
@@ -18007,7 +18007,7 @@
                 <a:cs typeface="Verdana"/>
                 <a:sym typeface="Verdana"/>
               </a:rPr>
-              <a:t>"should calculate base salary #{</a:t>
+              <a:t>"calculates base salary #{</a:t>
             </a:r>
             <a:r>
               <a:rPr lang="en" sz="1000">
@@ -18104,6 +18104,137 @@
                 <a:sym typeface="Verdana"/>
               </a:rPr>
               <a:t>+</a:t>
+            </a:r>
+            <a:br>
+              <a:rPr b="1" lang="en" sz="1000">
+                <a:solidFill>
+                  <a:schemeClr val="dk1"/>
+                </a:solidFill>
+                <a:latin typeface="Verdana"/>
+                <a:ea typeface="Verdana"/>
+                <a:cs typeface="Verdana"/>
+                <a:sym typeface="Verdana"/>
+              </a:rPr>
+            </a:br>
+            <a:r>
+              <a:rPr b="1" lang="en" sz="1000">
+                <a:solidFill>
+                  <a:schemeClr val="dk1"/>
+                </a:solidFill>
+                <a:latin typeface="Verdana"/>
+                <a:ea typeface="Verdana"/>
+                <a:cs typeface="Verdana"/>
+                <a:sym typeface="Verdana"/>
+              </a:rPr>
+              <a:t>                       </a:t>
+            </a:r>
+            <a:r>
+              <a:rPr lang="en" sz="1000">
+                <a:solidFill>
+                  <a:srgbClr val="DD1144"/>
+                </a:solidFill>
+                <a:latin typeface="Verdana"/>
+                <a:ea typeface="Verdana"/>
+                <a:cs typeface="Verdana"/>
+                <a:sym typeface="Verdana"/>
+              </a:rPr>
+              <a:t>"commission % #{</a:t>
+            </a:r>
+            <a:r>
+              <a:rPr lang="en" sz="1000">
+                <a:solidFill>
+                  <a:schemeClr val="dk1"/>
+                </a:solidFill>
+                <a:latin typeface="Verdana"/>
+                <a:ea typeface="Verdana"/>
+                <a:cs typeface="Verdana"/>
+                <a:sym typeface="Verdana"/>
+              </a:rPr>
+              <a:t>commission_pct</a:t>
+            </a:r>
+            <a:r>
+              <a:rPr lang="en" sz="1000">
+                <a:solidFill>
+                  <a:srgbClr val="DD1144"/>
+                </a:solidFill>
+                <a:latin typeface="Verdana"/>
+                <a:ea typeface="Verdana"/>
+                <a:cs typeface="Verdana"/>
+                <a:sym typeface="Verdana"/>
+              </a:rPr>
+              <a:t>} = salary #{</a:t>
+            </a:r>
+            <a:r>
+              <a:rPr lang="en" sz="1000">
+                <a:solidFill>
+                  <a:schemeClr val="dk1"/>
+                </a:solidFill>
+                <a:latin typeface="Verdana"/>
+                <a:ea typeface="Verdana"/>
+                <a:cs typeface="Verdana"/>
+                <a:sym typeface="Verdana"/>
+              </a:rPr>
+              <a:t>result</a:t>
+            </a:r>
+            <a:r>
+              <a:rPr b="1" lang="en" sz="1000">
+                <a:solidFill>
+                  <a:schemeClr val="dk1"/>
+                </a:solidFill>
+                <a:latin typeface="Verdana"/>
+                <a:ea typeface="Verdana"/>
+                <a:cs typeface="Verdana"/>
+                <a:sym typeface="Verdana"/>
+              </a:rPr>
+              <a:t>.</a:t>
+            </a:r>
+            <a:r>
+              <a:rPr lang="en" sz="1000">
+                <a:solidFill>
+                  <a:schemeClr val="dk1"/>
+                </a:solidFill>
+                <a:latin typeface="Verdana"/>
+                <a:ea typeface="Verdana"/>
+                <a:cs typeface="Verdana"/>
+                <a:sym typeface="Verdana"/>
+              </a:rPr>
+              <a:t>inspect</a:t>
+            </a:r>
+            <a:r>
+              <a:rPr lang="en" sz="1000">
+                <a:solidFill>
+                  <a:srgbClr val="DD1144"/>
+                </a:solidFill>
+                <a:latin typeface="Verdana"/>
+                <a:ea typeface="Verdana"/>
+                <a:cs typeface="Verdana"/>
+                <a:sym typeface="Verdana"/>
+              </a:rPr>
+              <a:t>}"</a:t>
+            </a:r>
+            <a:r>
+              <a:rPr lang="en" sz="1000">
+                <a:solidFill>
+                  <a:schemeClr val="dk1"/>
+                </a:solidFill>
+                <a:latin typeface="Verdana"/>
+                <a:ea typeface="Verdana"/>
+                <a:cs typeface="Verdana"/>
+                <a:sym typeface="Verdana"/>
+              </a:rPr>
+              <a:t> </a:t>
+            </a:r>
+            <a:r>
+              <a:rPr b="1" lang="en" sz="1000">
+                <a:solidFill>
+                  <a:schemeClr val="dk1"/>
+                </a:solidFill>
+                <a:latin typeface="Verdana"/>
+                <a:ea typeface="Verdana"/>
+                <a:cs typeface="Verdana"/>
+                <a:sym typeface="Verdana"/>
+              </a:rPr>
+              <a:t>do</a:t>
             </a:r>
             <a:br>
               <a:rPr lang="en" sz="1000">
@@ -18126,115 +18257,31 @@
                 <a:cs typeface="Verdana"/>
                 <a:sym typeface="Verdana"/>
               </a:rPr>
-              <a:t>                  </a:t>
+              <a:t>      employee </a:t>
+            </a:r>
+            <a:r>
+              <a:rPr b="1" lang="en" sz="1000">
+                <a:solidFill>
+                  <a:schemeClr val="dk1"/>
+                </a:solidFill>
+                <a:latin typeface="Verdana"/>
+                <a:ea typeface="Verdana"/>
+                <a:cs typeface="Verdana"/>
+                <a:sym typeface="Verdana"/>
+              </a:rPr>
+              <a:t>=</a:t>
             </a:r>
             <a:r>
               <a:rPr lang="en" sz="1000">
                 <a:solidFill>
-                  <a:srgbClr val="DD1144"/>
-                </a:solidFill>
-                <a:latin typeface="Verdana"/>
-                <a:ea typeface="Verdana"/>
-                <a:cs typeface="Verdana"/>
-                <a:sym typeface="Verdana"/>
-              </a:rPr>
-              <a:t>"commission percentage #{</a:t>
-            </a:r>
-            <a:r>
-              <a:rPr lang="en" sz="1000">
-                <a:solidFill>
-                  <a:schemeClr val="dk1"/>
-                </a:solidFill>
-                <a:latin typeface="Verdana"/>
-                <a:ea typeface="Verdana"/>
-                <a:cs typeface="Verdana"/>
-                <a:sym typeface="Verdana"/>
-              </a:rPr>
-              <a:t>commission_pct</a:t>
-            </a:r>
-            <a:r>
-              <a:rPr lang="en" sz="1000">
-                <a:solidFill>
-                  <a:srgbClr val="DD1144"/>
-                </a:solidFill>
-                <a:latin typeface="Verdana"/>
-                <a:ea typeface="Verdana"/>
-                <a:cs typeface="Verdana"/>
-                <a:sym typeface="Verdana"/>
-              </a:rPr>
-              <a:t>} = salary #{</a:t>
-            </a:r>
-            <a:r>
-              <a:rPr lang="en" sz="1000">
-                <a:solidFill>
-                  <a:schemeClr val="dk1"/>
-                </a:solidFill>
-                <a:latin typeface="Verdana"/>
-                <a:ea typeface="Verdana"/>
-                <a:cs typeface="Verdana"/>
-                <a:sym typeface="Verdana"/>
-              </a:rPr>
-              <a:t>result</a:t>
-            </a:r>
-            <a:r>
-              <a:rPr b="1" lang="en" sz="1000">
-                <a:solidFill>
-                  <a:schemeClr val="dk1"/>
-                </a:solidFill>
-                <a:latin typeface="Verdana"/>
-                <a:ea typeface="Verdana"/>
-                <a:cs typeface="Verdana"/>
-                <a:sym typeface="Verdana"/>
-              </a:rPr>
-              <a:t>.</a:t>
-            </a:r>
-            <a:r>
-              <a:rPr lang="en" sz="1000">
-                <a:solidFill>
-                  <a:schemeClr val="dk1"/>
-                </a:solidFill>
-                <a:latin typeface="Verdana"/>
-                <a:ea typeface="Verdana"/>
-                <a:cs typeface="Verdana"/>
-                <a:sym typeface="Verdana"/>
-              </a:rPr>
-              <a:t>inspect</a:t>
-            </a:r>
-            <a:r>
-              <a:rPr lang="en" sz="1000">
-                <a:solidFill>
-                  <a:srgbClr val="DD1144"/>
-                </a:solidFill>
-                <a:latin typeface="Verdana"/>
-                <a:ea typeface="Verdana"/>
-                <a:cs typeface="Verdana"/>
-                <a:sym typeface="Verdana"/>
-              </a:rPr>
-              <a:t>}"</a:t>
-            </a:r>
-            <a:r>
-              <a:rPr lang="en" sz="1000">
-                <a:solidFill>
-                  <a:schemeClr val="dk1"/>
-                </a:solidFill>
-                <a:latin typeface="Verdana"/>
-                <a:ea typeface="Verdana"/>
-                <a:cs typeface="Verdana"/>
-                <a:sym typeface="Verdana"/>
-              </a:rPr>
-              <a:t> </a:t>
-            </a:r>
-            <a:r>
-              <a:rPr b="1" lang="en" sz="1000">
-                <a:solidFill>
-                  <a:schemeClr val="dk1"/>
-                </a:solidFill>
-                <a:latin typeface="Verdana"/>
-                <a:ea typeface="Verdana"/>
-                <a:cs typeface="Verdana"/>
-                <a:sym typeface="Verdana"/>
-              </a:rPr>
-              <a:t>do</a:t>
+                  <a:schemeClr val="dk1"/>
+                </a:solidFill>
+                <a:latin typeface="Verdana"/>
+                <a:ea typeface="Verdana"/>
+                <a:cs typeface="Verdana"/>
+                <a:sym typeface="Verdana"/>
+              </a:rPr>
+              <a:t> create_employee(</a:t>
             </a:r>
             <a:br>
               <a:rPr lang="en" sz="1000">
@@ -18257,7 +18304,31 @@
                 <a:cs typeface="Verdana"/>
                 <a:sym typeface="Verdana"/>
               </a:rPr>
-              <a:t>      employee </a:t>
+              <a:t>              </a:t>
+            </a:r>
+            <a:r>
+              <a:rPr lang="en" sz="1000">
+                <a:solidFill>
+                  <a:srgbClr val="990073"/>
+                </a:solidFill>
+                <a:latin typeface="Verdana"/>
+                <a:ea typeface="Verdana"/>
+                <a:cs typeface="Verdana"/>
+                <a:sym typeface="Verdana"/>
+              </a:rPr>
+              <a:t>:commission_pct</a:t>
+            </a:r>
+            <a:r>
+              <a:rPr lang="en" sz="1000">
+                <a:solidFill>
+                  <a:schemeClr val="dk1"/>
+                </a:solidFill>
+                <a:latin typeface="Verdana"/>
+                <a:ea typeface="Verdana"/>
+                <a:cs typeface="Verdana"/>
+                <a:sym typeface="Verdana"/>
+              </a:rPr>
+              <a:t> </a:t>
             </a:r>
             <a:r>
               <a:rPr b="1" lang="en" sz="1000">
@@ -18269,7 +18340,7 @@
                 <a:cs typeface="Verdana"/>
                 <a:sym typeface="Verdana"/>
               </a:rPr>
-              <a:t>=</a:t>
+              <a:t>=&gt;</a:t>
             </a:r>
             <a:r>
               <a:rPr lang="en" sz="1000">
@@ -18281,7 +18352,7 @@
                 <a:cs typeface="Verdana"/>
                 <a:sym typeface="Verdana"/>
               </a:rPr>
-              <a:t> create_employee(</a:t>
+              <a:t> commission_pct,</a:t>
             </a:r>
             <a:br>
               <a:rPr lang="en" sz="1000">
@@ -18304,7 +18375,7 @@
                 <a:cs typeface="Verdana"/>
                 <a:sym typeface="Verdana"/>
               </a:rPr>
-              <a:t>        </a:t>
+              <a:t>              </a:t>
             </a:r>
             <a:r>
               <a:rPr lang="en" sz="1000">
@@ -18316,7 +18387,7 @@
                 <a:cs typeface="Verdana"/>
                 <a:sym typeface="Verdana"/>
               </a:rPr>
-              <a:t>:commission_pct</a:t>
+              <a:t>:salary</a:t>
             </a:r>
             <a:r>
               <a:rPr lang="en" sz="1000">
@@ -18352,7 +18423,7 @@
                 <a:cs typeface="Verdana"/>
                 <a:sym typeface="Verdana"/>
               </a:rPr>
-              <a:t> commission_pct,</a:t>
+              <a:t> salary)</a:t>
             </a:r>
             <a:br>
               <a:rPr lang="en" sz="1000">
@@ -18375,11 +18446,47 @@
                 <a:cs typeface="Verdana"/>
                 <a:sym typeface="Verdana"/>
               </a:rPr>
-              <a:t>        </a:t>
+              <a:t>      plsql</a:t>
+            </a:r>
+            <a:r>
+              <a:rPr b="1" lang="en" sz="1000">
+                <a:solidFill>
+                  <a:schemeClr val="dk1"/>
+                </a:solidFill>
+                <a:latin typeface="Verdana"/>
+                <a:ea typeface="Verdana"/>
+                <a:cs typeface="Verdana"/>
+                <a:sym typeface="Verdana"/>
+              </a:rPr>
+              <a:t>.</a:t>
             </a:r>
             <a:r>
               <a:rPr lang="en" sz="1000">
                 <a:solidFill>
+                  <a:schemeClr val="dk1"/>
+                </a:solidFill>
+                <a:latin typeface="Verdana"/>
+                <a:ea typeface="Verdana"/>
+                <a:cs typeface="Verdana"/>
+                <a:sym typeface="Verdana"/>
+              </a:rPr>
+              <a:t>award_bonus(employee</a:t>
+            </a:r>
+            <a:r>
+              <a:rPr b="1" lang="en" sz="1000">
+                <a:solidFill>
+                  <a:schemeClr val="dk1"/>
+                </a:solidFill>
+                <a:latin typeface="Verdana"/>
+                <a:ea typeface="Verdana"/>
+                <a:cs typeface="Verdana"/>
+                <a:sym typeface="Verdana"/>
+              </a:rPr>
+              <a:t>[</a:t>
+            </a:r>
+            <a:r>
+              <a:rPr lang="en" sz="1000">
+                <a:solidFill>
                   <a:srgbClr val="990073"/>
                 </a:solidFill>
                 <a:latin typeface="Verdana"/>
@@ -18387,7 +18494,19 @@
                 <a:cs typeface="Verdana"/>
                 <a:sym typeface="Verdana"/>
               </a:rPr>
-              <a:t>:salary</a:t>
+              <a:t>:employee_id</a:t>
+            </a:r>
+            <a:r>
+              <a:rPr b="1" lang="en" sz="1000">
+                <a:solidFill>
+                  <a:schemeClr val="dk1"/>
+                </a:solidFill>
+                <a:latin typeface="Verdana"/>
+                <a:ea typeface="Verdana"/>
+                <a:cs typeface="Verdana"/>
+                <a:sym typeface="Verdana"/>
+              </a:rPr>
+              <a:t>]</a:t>
             </a:r>
             <a:r>
               <a:rPr lang="en" sz="1000">
@@ -18399,31 +18518,7 @@
                 <a:cs typeface="Verdana"/>
                 <a:sym typeface="Verdana"/>
               </a:rPr>
-              <a:t> </a:t>
-            </a:r>
-            <a:r>
-              <a:rPr b="1" lang="en" sz="1000">
-                <a:solidFill>
-                  <a:schemeClr val="dk1"/>
-                </a:solidFill>
-                <a:latin typeface="Verdana"/>
-                <a:ea typeface="Verdana"/>
-                <a:cs typeface="Verdana"/>
-                <a:sym typeface="Verdana"/>
-              </a:rPr>
-              <a:t>=&gt;</a:t>
-            </a:r>
-            <a:r>
-              <a:rPr lang="en" sz="1000">
-                <a:solidFill>
-                  <a:schemeClr val="dk1"/>
-                </a:solidFill>
-                <a:latin typeface="Verdana"/>
-                <a:ea typeface="Verdana"/>
-                <a:cs typeface="Verdana"/>
-                <a:sym typeface="Verdana"/>
-              </a:rPr>
-              <a:t> salary</a:t>
+              <a:t>, sales_amt)</a:t>
             </a:r>
             <a:br>
               <a:rPr lang="en" sz="1000">
@@ -18446,19 +18541,44 @@
                 <a:cs typeface="Verdana"/>
                 <a:sym typeface="Verdana"/>
               </a:rPr>
-              <a:t>      )</a:t>
-            </a:r>
-            <a:br>
+              <a:t>      expect(get_employee(employee</a:t>
+            </a:r>
+            <a:r>
+              <a:rPr b="1" lang="en" sz="1000">
+                <a:solidFill>
+                  <a:schemeClr val="dk1"/>
+                </a:solidFill>
+                <a:latin typeface="Verdana"/>
+                <a:ea typeface="Verdana"/>
+                <a:cs typeface="Verdana"/>
+                <a:sym typeface="Verdana"/>
+              </a:rPr>
+              <a:t>[</a:t>
+            </a:r>
+            <a:r>
               <a:rPr lang="en" sz="1000">
                 <a:solidFill>
-                  <a:schemeClr val="dk1"/>
-                </a:solidFill>
-                <a:latin typeface="Verdana"/>
-                <a:ea typeface="Verdana"/>
-                <a:cs typeface="Verdana"/>
-                <a:sym typeface="Verdana"/>
-              </a:rPr>
-            </a:br>
+                  <a:srgbClr val="990073"/>
+                </a:solidFill>
+                <a:latin typeface="Verdana"/>
+                <a:ea typeface="Verdana"/>
+                <a:cs typeface="Verdana"/>
+                <a:sym typeface="Verdana"/>
+              </a:rPr>
+              <a:t>:employee_id</a:t>
+            </a:r>
+            <a:r>
+              <a:rPr b="1" lang="en" sz="1000">
+                <a:solidFill>
+                  <a:schemeClr val="dk1"/>
+                </a:solidFill>
+                <a:latin typeface="Verdana"/>
+                <a:ea typeface="Verdana"/>
+                <a:cs typeface="Verdana"/>
+                <a:sym typeface="Verdana"/>
+              </a:rPr>
+              <a:t>]</a:t>
+            </a:r>
             <a:r>
               <a:rPr lang="en" sz="1000">
                 <a:solidFill>
@@ -18469,7 +18589,7 @@
                 <a:cs typeface="Verdana"/>
                 <a:sym typeface="Verdana"/>
               </a:rPr>
-              <a:t>      plsql</a:t>
+              <a:t>)</a:t>
             </a:r>
             <a:r>
               <a:rPr b="1" lang="en" sz="1000">
@@ -18481,19 +18601,19 @@
                 <a:cs typeface="Verdana"/>
                 <a:sym typeface="Verdana"/>
               </a:rPr>
-              <a:t>.</a:t>
+              <a:t>[</a:t>
             </a:r>
             <a:r>
               <a:rPr lang="en" sz="1000">
                 <a:solidFill>
-                  <a:schemeClr val="dk1"/>
-                </a:solidFill>
-                <a:latin typeface="Verdana"/>
-                <a:ea typeface="Verdana"/>
-                <a:cs typeface="Verdana"/>
-                <a:sym typeface="Verdana"/>
-              </a:rPr>
-              <a:t>award_bonus(employee</a:t>
+                  <a:srgbClr val="990073"/>
+                </a:solidFill>
+                <a:latin typeface="Verdana"/>
+                <a:ea typeface="Verdana"/>
+                <a:cs typeface="Verdana"/>
+                <a:sym typeface="Verdana"/>
+              </a:rPr>
+              <a:t>:salary</a:t>
             </a:r>
             <a:r>
               <a:rPr b="1" lang="en" sz="1000">
@@ -18505,150 +18625,19 @@
                 <a:cs typeface="Verdana"/>
                 <a:sym typeface="Verdana"/>
               </a:rPr>
-              <a:t>[</a:t>
+              <a:t>]).to eq </a:t>
             </a:r>
             <a:r>
               <a:rPr lang="en" sz="1000">
                 <a:solidFill>
-                  <a:srgbClr val="990073"/>
-                </a:solidFill>
-                <a:latin typeface="Verdana"/>
-                <a:ea typeface="Verdana"/>
-                <a:cs typeface="Verdana"/>
-                <a:sym typeface="Verdana"/>
-              </a:rPr>
-              <a:t>:employee_id</a:t>
-            </a:r>
-            <a:r>
-              <a:rPr b="1" lang="en" sz="1000">
-                <a:solidFill>
-                  <a:schemeClr val="dk1"/>
-                </a:solidFill>
-                <a:latin typeface="Verdana"/>
-                <a:ea typeface="Verdana"/>
-                <a:cs typeface="Verdana"/>
-                <a:sym typeface="Verdana"/>
-              </a:rPr>
-              <a:t>]</a:t>
-            </a:r>
-            <a:r>
-              <a:rPr lang="en" sz="1000">
-                <a:solidFill>
-                  <a:schemeClr val="dk1"/>
-                </a:solidFill>
-                <a:latin typeface="Verdana"/>
-                <a:ea typeface="Verdana"/>
-                <a:cs typeface="Verdana"/>
-                <a:sym typeface="Verdana"/>
-              </a:rPr>
-              <a:t>, sales_amt)</a:t>
-            </a:r>
-            <a:br>
-              <a:rPr lang="en" sz="1000">
-                <a:solidFill>
-                  <a:schemeClr val="dk1"/>
-                </a:solidFill>
-                <a:latin typeface="Verdana"/>
-                <a:ea typeface="Verdana"/>
-                <a:cs typeface="Verdana"/>
-                <a:sym typeface="Verdana"/>
-              </a:rPr>
-            </a:br>
-            <a:r>
-              <a:rPr lang="en" sz="1000">
-                <a:solidFill>
-                  <a:schemeClr val="dk1"/>
-                </a:solidFill>
-                <a:latin typeface="Verdana"/>
-                <a:ea typeface="Verdana"/>
-                <a:cs typeface="Verdana"/>
-                <a:sym typeface="Verdana"/>
-              </a:rPr>
-              <a:t>      expect(get_employee(employee</a:t>
-            </a:r>
-            <a:r>
-              <a:rPr b="1" lang="en" sz="1000">
-                <a:solidFill>
-                  <a:schemeClr val="dk1"/>
-                </a:solidFill>
-                <a:latin typeface="Verdana"/>
-                <a:ea typeface="Verdana"/>
-                <a:cs typeface="Verdana"/>
-                <a:sym typeface="Verdana"/>
-              </a:rPr>
-              <a:t>[</a:t>
-            </a:r>
-            <a:r>
-              <a:rPr lang="en" sz="1000">
-                <a:solidFill>
-                  <a:srgbClr val="990073"/>
-                </a:solidFill>
-                <a:latin typeface="Verdana"/>
-                <a:ea typeface="Verdana"/>
-                <a:cs typeface="Verdana"/>
-                <a:sym typeface="Verdana"/>
-              </a:rPr>
-              <a:t>:employee_id</a:t>
-            </a:r>
-            <a:r>
-              <a:rPr b="1" lang="en" sz="1000">
-                <a:solidFill>
-                  <a:schemeClr val="dk1"/>
-                </a:solidFill>
-                <a:latin typeface="Verdana"/>
-                <a:ea typeface="Verdana"/>
-                <a:cs typeface="Verdana"/>
-                <a:sym typeface="Verdana"/>
-              </a:rPr>
-              <a:t>]</a:t>
-            </a:r>
-            <a:r>
-              <a:rPr lang="en" sz="1000">
-                <a:solidFill>
-                  <a:schemeClr val="dk1"/>
-                </a:solidFill>
-                <a:latin typeface="Verdana"/>
-                <a:ea typeface="Verdana"/>
-                <a:cs typeface="Verdana"/>
-                <a:sym typeface="Verdana"/>
-              </a:rPr>
-              <a:t>)</a:t>
-            </a:r>
-            <a:r>
-              <a:rPr b="1" lang="en" sz="1000">
-                <a:solidFill>
-                  <a:schemeClr val="dk1"/>
-                </a:solidFill>
-                <a:latin typeface="Verdana"/>
-                <a:ea typeface="Verdana"/>
-                <a:cs typeface="Verdana"/>
-                <a:sym typeface="Verdana"/>
-              </a:rPr>
-              <a:t>[</a:t>
-            </a:r>
-            <a:r>
-              <a:rPr lang="en" sz="1000">
-                <a:solidFill>
-                  <a:srgbClr val="990073"/>
-                </a:solidFill>
-                <a:latin typeface="Verdana"/>
-                <a:ea typeface="Verdana"/>
-                <a:cs typeface="Verdana"/>
-                <a:sym typeface="Verdana"/>
-              </a:rPr>
-              <a:t>:salary</a:t>
-            </a:r>
-            <a:r>
-              <a:rPr b="1" lang="en" sz="1000">
-                <a:solidFill>
-                  <a:schemeClr val="dk1"/>
-                </a:solidFill>
-                <a:latin typeface="Verdana"/>
-                <a:ea typeface="Verdana"/>
-                <a:cs typeface="Verdana"/>
-                <a:sym typeface="Verdana"/>
-              </a:rPr>
-              <a:t>]).to eq result</a:t>
+                  <a:schemeClr val="dk1"/>
+                </a:solidFill>
+                <a:latin typeface="Verdana"/>
+                <a:ea typeface="Verdana"/>
+                <a:cs typeface="Verdana"/>
+                <a:sym typeface="Verdana"/>
+              </a:rPr>
+              <a:t>result</a:t>
             </a:r>
             <a:br>
               <a:rPr lang="en" sz="1000">
@@ -18804,8 +18793,8 @@
         </p:nvSpPr>
         <p:spPr>
           <a:xfrm>
-            <a:off x="5416900" y="1536625"/>
-            <a:ext cx="3415499" cy="4555199"/>
+            <a:off x="6228825" y="1536625"/>
+            <a:ext cx="2603700" cy="4555199"/>
           </a:xfrm>
           <a:prstGeom prst="rect">
             <a:avLst/>
@@ -23009,7 +22998,7 @@
         <p:spPr>
           <a:xfrm>
             <a:off x="1726025" y="1356875"/>
-            <a:ext cx="5691950" cy="5271700"/>
+            <a:ext cx="4268961" cy="3953774"/>
           </a:xfrm>
           <a:prstGeom prst="rect">
             <a:avLst/>
@@ -24286,7 +24275,7 @@
         <p:spPr>
           <a:xfrm>
             <a:off x="6750550" y="5945437"/>
-            <a:ext cx="1847850" cy="847725"/>
+            <a:ext cx="1385887" cy="635793"/>
           </a:xfrm>
           <a:prstGeom prst="rect">
             <a:avLst/>
@@ -24314,7 +24303,7 @@
         <p:spPr>
           <a:xfrm>
             <a:off x="548350" y="6199700"/>
-            <a:ext cx="2259175" cy="558849"/>
+            <a:ext cx="1694381" cy="419137"/>
           </a:xfrm>
           <a:prstGeom prst="rect">
             <a:avLst/>
@@ -25189,7 +25178,7 @@
         <p:spPr>
           <a:xfrm>
             <a:off x="423849" y="172425"/>
-            <a:ext cx="8210925" cy="6007399"/>
+            <a:ext cx="6158194" cy="4505549"/>
           </a:xfrm>
           <a:prstGeom prst="rect">
             <a:avLst/>
@@ -25989,7 +25978,7 @@
         <p:spPr>
           <a:xfrm>
             <a:off x="937936" y="1642000"/>
-            <a:ext cx="6827114" cy="4575624"/>
+            <a:ext cx="5120336" cy="3431718"/>
           </a:xfrm>
           <a:prstGeom prst="rect">
             <a:avLst/>

</xml_diff>